<commit_message>
Update schedule + slides
update from 5/6 Session 2
</commit_message>
<xml_diff>
--- a/Session2.pptx
+++ b/Session2.pptx
@@ -9,8 +9,9 @@
     <p:sldId id="261" r:id="rId3"/>
     <p:sldId id="257" r:id="rId4"/>
     <p:sldId id="258" r:id="rId5"/>
-    <p:sldId id="259" r:id="rId6"/>
-    <p:sldId id="260" r:id="rId7"/>
+    <p:sldId id="262" r:id="rId6"/>
+    <p:sldId id="259" r:id="rId7"/>
+    <p:sldId id="260" r:id="rId8"/>
   </p:sldIdLst>
   <p:sldSz cx="9144000" cy="6858000" type="letter"/>
   <p:notesSz cx="6858000" cy="9144000"/>
@@ -109,6 +110,11 @@
       </a:defRPr>
     </a:lvl9pPr>
   </p:defaultTextStyle>
+  <p:extLst>
+    <p:ext uri="{EFAFB233-063F-42B5-8137-9DF3F51BA10A}">
+      <p15:sldGuideLst xmlns:p15="http://schemas.microsoft.com/office/powerpoint/2012/main"/>
+    </p:ext>
+  </p:extLst>
 </p:presentation>
 </file>
 
@@ -3116,19 +3122,25 @@
             </a:r>
             <a:r>
               <a:rPr lang="en-US" dirty="0"/>
-              <a:t> repo and Wiki Page</a:t>
+              <a:t> repo and Wiki Page - collaboration</a:t>
             </a:r>
           </a:p>
           <a:p>
             <a:r>
               <a:rPr lang="en-US" dirty="0"/>
-              <a:t>Wiki page for the release checklist?</a:t>
+              <a:t>Wiki page and repo for the release checklist?</a:t>
             </a:r>
           </a:p>
           <a:p>
             <a:r>
               <a:rPr lang="en-US" dirty="0"/>
               <a:t>Agenda bashing for the conference</a:t>
+            </a:r>
+          </a:p>
+          <a:p>
+            <a:r>
+              <a:rPr lang="en-US" dirty="0"/>
+              <a:t>Namespace action from session 1</a:t>
             </a:r>
           </a:p>
           <a:p>
@@ -3226,7 +3238,7 @@
           <a:p>
             <a:r>
               <a:rPr lang="en-US" dirty="0"/>
-              <a:t>Identify the schema constraints required/desired for both architectural schema and validation schema</a:t>
+              <a:t>Identify the syntax constraints required/desired for both architectural syntax and validation syntax</a:t>
             </a:r>
           </a:p>
           <a:p>
@@ -3380,6 +3392,165 @@
           <p:cNvPr id="2" name="Title 1">
             <a:extLst>
               <a:ext uri="{FF2B5EF4-FFF2-40B4-BE49-F238E27FC236}">
+                <a16:creationId xmlns:a16="http://schemas.microsoft.com/office/drawing/2014/main" id="{EB9F2409-D5CC-8A40-9584-51B26ECE0486}"/>
+              </a:ext>
+            </a:extLst>
+          </p:cNvPr>
+          <p:cNvSpPr>
+            <a:spLocks noGrp="1"/>
+          </p:cNvSpPr>
+          <p:nvPr>
+            <p:ph type="title"/>
+          </p:nvPr>
+        </p:nvSpPr>
+        <p:spPr/>
+        <p:txBody>
+          <a:bodyPr/>
+          <a:lstStyle/>
+          <a:p>
+            <a:r>
+              <a:rPr lang="en-US" dirty="0"/>
+              <a:t>Complex data types</a:t>
+            </a:r>
+          </a:p>
+        </p:txBody>
+      </p:sp>
+      <p:sp>
+        <p:nvSpPr>
+          <p:cNvPr id="3" name="Content Placeholder 2">
+            <a:extLst>
+              <a:ext uri="{FF2B5EF4-FFF2-40B4-BE49-F238E27FC236}">
+                <a16:creationId xmlns:a16="http://schemas.microsoft.com/office/drawing/2014/main" id="{0D219A19-9CA6-7D42-B0FE-8AF727EA3C0F}"/>
+              </a:ext>
+            </a:extLst>
+          </p:cNvPr>
+          <p:cNvSpPr>
+            <a:spLocks noGrp="1"/>
+          </p:cNvSpPr>
+          <p:nvPr>
+            <p:ph idx="1"/>
+          </p:nvPr>
+        </p:nvSpPr>
+        <p:spPr/>
+        <p:txBody>
+          <a:bodyPr>
+            <a:normAutofit fontScale="92500" lnSpcReduction="10000"/>
+          </a:bodyPr>
+          <a:lstStyle/>
+          <a:p>
+            <a:r>
+              <a:rPr lang="en-US" dirty="0"/>
+              <a:t>Complex data types</a:t>
+            </a:r>
+          </a:p>
+          <a:p>
+            <a:pPr lvl="1"/>
+            <a:r>
+              <a:rPr lang="en-US" dirty="0"/>
+              <a:t>Some ecosystems don't support, what will the common models support?</a:t>
+            </a:r>
+          </a:p>
+          <a:p>
+            <a:pPr lvl="1"/>
+            <a:r>
+              <a:rPr lang="en-US" dirty="0"/>
+              <a:t>Some models are not IoT models, e.g. components of a video stream</a:t>
+            </a:r>
+          </a:p>
+          <a:p>
+            <a:pPr lvl="1"/>
+            <a:r>
+              <a:rPr lang="en-US" dirty="0"/>
+              <a:t>The </a:t>
+            </a:r>
+            <a:r>
+              <a:rPr lang="en-US" dirty="0" err="1"/>
+              <a:t>dataschema</a:t>
+            </a:r>
+            <a:r>
+              <a:rPr lang="en-US" dirty="0"/>
+              <a:t> may contain affordances – related to the multi-instance </a:t>
+            </a:r>
+          </a:p>
+          <a:p>
+            <a:pPr lvl="1"/>
+            <a:r>
+              <a:rPr lang="en-US" dirty="0"/>
+              <a:t>Settings related to a video stream – format, speed, encodings</a:t>
+            </a:r>
+          </a:p>
+          <a:p>
+            <a:pPr lvl="1"/>
+            <a:r>
+              <a:rPr lang="en-US" dirty="0"/>
+              <a:t>IETF has SDP parameters which cause problems</a:t>
+            </a:r>
+          </a:p>
+          <a:p>
+            <a:pPr lvl="1"/>
+            <a:r>
+              <a:rPr lang="en-US" dirty="0"/>
+              <a:t>Groupings and dependencies – array of JSON Objects</a:t>
+            </a:r>
+          </a:p>
+          <a:p>
+            <a:pPr lvl="1"/>
+            <a:r>
+              <a:rPr lang="en-US" dirty="0"/>
+              <a:t>We may only need simple models at first</a:t>
+            </a:r>
+          </a:p>
+          <a:p>
+            <a:pPr lvl="1"/>
+            <a:r>
+              <a:rPr lang="en-US" dirty="0"/>
+              <a:t>ODM features that may not be automatically translate-able</a:t>
+            </a:r>
+          </a:p>
+          <a:p>
+            <a:pPr lvl="1"/>
+            <a:r>
+              <a:rPr lang="en-US" dirty="0"/>
+              <a:t>Defer to post-release?</a:t>
+            </a:r>
+          </a:p>
+        </p:txBody>
+      </p:sp>
+    </p:spTree>
+    <p:extLst>
+      <p:ext uri="{BB962C8B-B14F-4D97-AF65-F5344CB8AC3E}">
+        <p14:creationId xmlns:p14="http://schemas.microsoft.com/office/powerpoint/2010/main" val="1436011557"/>
+      </p:ext>
+    </p:extLst>
+  </p:cSld>
+  <p:clrMapOvr>
+    <a:masterClrMapping/>
+  </p:clrMapOvr>
+</p:sld>
+</file>
+
+<file path=ppt/slides/slide6.xml><?xml version="1.0" encoding="utf-8"?>
+<p:sld xmlns:a="http://schemas.openxmlformats.org/drawingml/2006/main" xmlns:r="http://schemas.openxmlformats.org/officeDocument/2006/relationships" xmlns:p="http://schemas.openxmlformats.org/presentationml/2006/main">
+  <p:cSld>
+    <p:spTree>
+      <p:nvGrpSpPr>
+        <p:cNvPr id="1" name=""/>
+        <p:cNvGrpSpPr/>
+        <p:nvPr/>
+      </p:nvGrpSpPr>
+      <p:grpSpPr>
+        <a:xfrm>
+          <a:off x="0" y="0"/>
+          <a:ext cx="0" cy="0"/>
+          <a:chOff x="0" y="0"/>
+          <a:chExt cx="0" cy="0"/>
+        </a:xfrm>
+      </p:grpSpPr>
+      <p:sp>
+        <p:nvSpPr>
+          <p:cNvPr id="2" name="Title 1">
+            <a:extLst>
+              <a:ext uri="{FF2B5EF4-FFF2-40B4-BE49-F238E27FC236}">
                 <a16:creationId xmlns:a16="http://schemas.microsoft.com/office/drawing/2014/main" id="{41622332-7BF9-CC40-837C-5EFE9BC7CE30}"/>
               </a:ext>
             </a:extLst>
@@ -3456,7 +3627,7 @@
 </p:sld>
 </file>
 
-<file path=ppt/slides/slide6.xml><?xml version="1.0" encoding="utf-8"?>
+<file path=ppt/slides/slide7.xml><?xml version="1.0" encoding="utf-8"?>
 <p:sld xmlns:a="http://schemas.openxmlformats.org/drawingml/2006/main" xmlns:r="http://schemas.openxmlformats.org/officeDocument/2006/relationships" xmlns:p="http://schemas.openxmlformats.org/presentationml/2006/main">
   <p:cSld>
     <p:spTree>

</xml_diff>

<commit_message>
Slides for session 6
</commit_message>
<xml_diff>
--- a/Session2.pptx
+++ b/Session2.pptx
@@ -249,7 +249,7 @@
           <a:p>
             <a:fld id="{47A081E9-3AC1-954E-AE66-60B8986F197E}" type="datetimeFigureOut">
               <a:rPr lang="en-US" smtClean="0"/>
-              <a:t>5/6/20</a:t>
+              <a:t>5/11/20</a:t>
             </a:fld>
             <a:endParaRPr lang="en-US"/>
           </a:p>
@@ -419,7 +419,7 @@
           <a:p>
             <a:fld id="{47A081E9-3AC1-954E-AE66-60B8986F197E}" type="datetimeFigureOut">
               <a:rPr lang="en-US" smtClean="0"/>
-              <a:t>5/6/20</a:t>
+              <a:t>5/11/20</a:t>
             </a:fld>
             <a:endParaRPr lang="en-US"/>
           </a:p>
@@ -599,7 +599,7 @@
           <a:p>
             <a:fld id="{47A081E9-3AC1-954E-AE66-60B8986F197E}" type="datetimeFigureOut">
               <a:rPr lang="en-US" smtClean="0"/>
-              <a:t>5/6/20</a:t>
+              <a:t>5/11/20</a:t>
             </a:fld>
             <a:endParaRPr lang="en-US"/>
           </a:p>
@@ -769,7 +769,7 @@
           <a:p>
             <a:fld id="{47A081E9-3AC1-954E-AE66-60B8986F197E}" type="datetimeFigureOut">
               <a:rPr lang="en-US" smtClean="0"/>
-              <a:t>5/6/20</a:t>
+              <a:t>5/11/20</a:t>
             </a:fld>
             <a:endParaRPr lang="en-US"/>
           </a:p>
@@ -1013,7 +1013,7 @@
           <a:p>
             <a:fld id="{47A081E9-3AC1-954E-AE66-60B8986F197E}" type="datetimeFigureOut">
               <a:rPr lang="en-US" smtClean="0"/>
-              <a:t>5/6/20</a:t>
+              <a:t>5/11/20</a:t>
             </a:fld>
             <a:endParaRPr lang="en-US"/>
           </a:p>
@@ -1245,7 +1245,7 @@
           <a:p>
             <a:fld id="{47A081E9-3AC1-954E-AE66-60B8986F197E}" type="datetimeFigureOut">
               <a:rPr lang="en-US" smtClean="0"/>
-              <a:t>5/6/20</a:t>
+              <a:t>5/11/20</a:t>
             </a:fld>
             <a:endParaRPr lang="en-US"/>
           </a:p>
@@ -1612,7 +1612,7 @@
           <a:p>
             <a:fld id="{47A081E9-3AC1-954E-AE66-60B8986F197E}" type="datetimeFigureOut">
               <a:rPr lang="en-US" smtClean="0"/>
-              <a:t>5/6/20</a:t>
+              <a:t>5/11/20</a:t>
             </a:fld>
             <a:endParaRPr lang="en-US"/>
           </a:p>
@@ -1730,7 +1730,7 @@
           <a:p>
             <a:fld id="{47A081E9-3AC1-954E-AE66-60B8986F197E}" type="datetimeFigureOut">
               <a:rPr lang="en-US" smtClean="0"/>
-              <a:t>5/6/20</a:t>
+              <a:t>5/11/20</a:t>
             </a:fld>
             <a:endParaRPr lang="en-US"/>
           </a:p>
@@ -1825,7 +1825,7 @@
           <a:p>
             <a:fld id="{47A081E9-3AC1-954E-AE66-60B8986F197E}" type="datetimeFigureOut">
               <a:rPr lang="en-US" smtClean="0"/>
-              <a:t>5/6/20</a:t>
+              <a:t>5/11/20</a:t>
             </a:fld>
             <a:endParaRPr lang="en-US"/>
           </a:p>
@@ -2102,7 +2102,7 @@
           <a:p>
             <a:fld id="{47A081E9-3AC1-954E-AE66-60B8986F197E}" type="datetimeFigureOut">
               <a:rPr lang="en-US" smtClean="0"/>
-              <a:t>5/6/20</a:t>
+              <a:t>5/11/20</a:t>
             </a:fld>
             <a:endParaRPr lang="en-US"/>
           </a:p>
@@ -2359,7 +2359,7 @@
           <a:p>
             <a:fld id="{47A081E9-3AC1-954E-AE66-60B8986F197E}" type="datetimeFigureOut">
               <a:rPr lang="en-US" smtClean="0"/>
-              <a:t>5/6/20</a:t>
+              <a:t>5/11/20</a:t>
             </a:fld>
             <a:endParaRPr lang="en-US"/>
           </a:p>
@@ -2572,7 +2572,7 @@
           <a:p>
             <a:fld id="{47A081E9-3AC1-954E-AE66-60B8986F197E}" type="datetimeFigureOut">
               <a:rPr lang="en-US" smtClean="0"/>
-              <a:t>5/6/20</a:t>
+              <a:t>5/11/20</a:t>
             </a:fld>
             <a:endParaRPr lang="en-US"/>
           </a:p>
@@ -3000,7 +3000,7 @@
           <a:p>
             <a:r>
               <a:rPr lang="en-US" dirty="0" err="1"/>
-              <a:t>OnwDM</a:t>
+              <a:t>OneDM</a:t>
             </a:r>
             <a:r>
               <a:rPr lang="en-US" dirty="0"/>

</xml_diff>